<commit_message>
cambios en los hiper vinculos
</commit_message>
<xml_diff>
--- a/Capitulo2_JoseMenaDelgado/Variables Funciones y Graficas.pptx
+++ b/Capitulo2_JoseMenaDelgado/Variables Funciones y Graficas.pptx
@@ -347,7 +347,7 @@
           <a:p>
             <a:fld id="{6872D90B-7403-4DE5-A993-8245E8500D91}" type="datetimeFigureOut">
               <a:rPr lang="es-MX" smtClean="0"/>
-              <a:t>02/02/2021</a:t>
+              <a:t>03/02/2021</a:t>
             </a:fld>
             <a:endParaRPr lang="es-MX" dirty="0"/>
           </a:p>
@@ -537,7 +537,7 @@
           <a:p>
             <a:fld id="{6872D90B-7403-4DE5-A993-8245E8500D91}" type="datetimeFigureOut">
               <a:rPr lang="es-MX" smtClean="0"/>
-              <a:t>02/02/2021</a:t>
+              <a:t>03/02/2021</a:t>
             </a:fld>
             <a:endParaRPr lang="es-MX" dirty="0"/>
           </a:p>
@@ -717,7 +717,7 @@
           <a:p>
             <a:fld id="{6872D90B-7403-4DE5-A993-8245E8500D91}" type="datetimeFigureOut">
               <a:rPr lang="es-MX" smtClean="0"/>
-              <a:t>02/02/2021</a:t>
+              <a:t>03/02/2021</a:t>
             </a:fld>
             <a:endParaRPr lang="es-MX" dirty="0"/>
           </a:p>
@@ -887,7 +887,7 @@
           <a:p>
             <a:fld id="{6872D90B-7403-4DE5-A993-8245E8500D91}" type="datetimeFigureOut">
               <a:rPr lang="es-MX" smtClean="0"/>
-              <a:t>02/02/2021</a:t>
+              <a:t>03/02/2021</a:t>
             </a:fld>
             <a:endParaRPr lang="es-MX" dirty="0"/>
           </a:p>
@@ -1143,7 +1143,7 @@
           <a:p>
             <a:fld id="{6872D90B-7403-4DE5-A993-8245E8500D91}" type="datetimeFigureOut">
               <a:rPr lang="es-MX" smtClean="0"/>
-              <a:t>02/02/2021</a:t>
+              <a:t>03/02/2021</a:t>
             </a:fld>
             <a:endParaRPr lang="es-MX" dirty="0"/>
           </a:p>
@@ -1431,7 +1431,7 @@
           <a:p>
             <a:fld id="{6872D90B-7403-4DE5-A993-8245E8500D91}" type="datetimeFigureOut">
               <a:rPr lang="es-MX" smtClean="0"/>
-              <a:t>02/02/2021</a:t>
+              <a:t>03/02/2021</a:t>
             </a:fld>
             <a:endParaRPr lang="es-MX" dirty="0"/>
           </a:p>
@@ -1869,7 +1869,7 @@
           <a:p>
             <a:fld id="{6872D90B-7403-4DE5-A993-8245E8500D91}" type="datetimeFigureOut">
               <a:rPr lang="es-MX" smtClean="0"/>
-              <a:t>02/02/2021</a:t>
+              <a:t>03/02/2021</a:t>
             </a:fld>
             <a:endParaRPr lang="es-MX" dirty="0"/>
           </a:p>
@@ -1987,7 +1987,7 @@
           <a:p>
             <a:fld id="{6872D90B-7403-4DE5-A993-8245E8500D91}" type="datetimeFigureOut">
               <a:rPr lang="es-MX" smtClean="0"/>
-              <a:t>02/02/2021</a:t>
+              <a:t>03/02/2021</a:t>
             </a:fld>
             <a:endParaRPr lang="es-MX" dirty="0"/>
           </a:p>
@@ -2082,7 +2082,7 @@
           <a:p>
             <a:fld id="{6872D90B-7403-4DE5-A993-8245E8500D91}" type="datetimeFigureOut">
               <a:rPr lang="es-MX" smtClean="0"/>
-              <a:t>02/02/2021</a:t>
+              <a:t>03/02/2021</a:t>
             </a:fld>
             <a:endParaRPr lang="es-MX" dirty="0"/>
           </a:p>
@@ -2438,7 +2438,7 @@
           <a:p>
             <a:fld id="{6872D90B-7403-4DE5-A993-8245E8500D91}" type="datetimeFigureOut">
               <a:rPr lang="es-MX" smtClean="0"/>
-              <a:t>02/02/2021</a:t>
+              <a:t>03/02/2021</a:t>
             </a:fld>
             <a:endParaRPr lang="es-MX" dirty="0"/>
           </a:p>
@@ -2754,7 +2754,7 @@
           <a:p>
             <a:fld id="{6872D90B-7403-4DE5-A993-8245E8500D91}" type="datetimeFigureOut">
               <a:rPr lang="es-MX" smtClean="0"/>
-              <a:t>02/02/2021</a:t>
+              <a:t>03/02/2021</a:t>
             </a:fld>
             <a:endParaRPr lang="es-MX" dirty="0"/>
           </a:p>
@@ -2987,7 +2987,7 @@
           <a:p>
             <a:fld id="{6872D90B-7403-4DE5-A993-8245E8500D91}" type="datetimeFigureOut">
               <a:rPr lang="es-MX" smtClean="0"/>
-              <a:t>02/02/2021</a:t>
+              <a:t>03/02/2021</a:t>
             </a:fld>
             <a:endParaRPr lang="es-MX" dirty="0"/>
           </a:p>
@@ -3442,7 +3442,7 @@
         <p:spPr>
           <a:xfrm>
             <a:off x="603504" y="424070"/>
-            <a:ext cx="10782300" cy="3699197"/>
+            <a:ext cx="10782300" cy="3090253"/>
           </a:xfrm>
         </p:spPr>
         <p:txBody>
@@ -3479,10 +3479,15 @@
             <p:ph type="subTitle" idx="1"/>
           </p:nvPr>
         </p:nvSpPr>
-        <p:spPr/>
+        <p:spPr>
+          <a:xfrm>
+            <a:off x="685673" y="3428999"/>
+            <a:ext cx="9228201" cy="2932043"/>
+          </a:xfrm>
+        </p:spPr>
         <p:txBody>
           <a:bodyPr>
-            <a:normAutofit fontScale="77500" lnSpcReduction="20000"/>
+            <a:normAutofit/>
           </a:bodyPr>
           <a:lstStyle/>
           <a:p>
@@ -3506,8 +3511,20 @@
           <a:p>
             <a:r>
               <a:rPr lang="es-MX" dirty="0"/>
-              <a:t>Funciones internas de MATLAB</a:t>
-            </a:r>
+              <a:t>Git clone https://github.com/emena16/Topicos.git</a:t>
+            </a:r>
+          </a:p>
+          <a:p>
+            <a:r>
+              <a:rPr lang="es-MX" dirty="0">
+                <a:hlinkClick r:id="rId2"/>
+              </a:rPr>
+              <a:t>Link de descarga del contenido</a:t>
+            </a:r>
+            <a:endParaRPr lang="es-MX" dirty="0"/>
+          </a:p>
+          <a:p>
+            <a:endParaRPr lang="es-MX" dirty="0"/>
           </a:p>
         </p:txBody>
       </p:sp>
@@ -3526,7 +3543,7 @@
           <p:nvPr/>
         </p:nvPicPr>
         <p:blipFill>
-          <a:blip r:embed="rId2">
+          <a:blip r:embed="rId3">
             <a:extLst>
               <a:ext uri="{28A0092B-C50C-407E-A947-70E740481C1C}">
                 <a14:useLocalDpi xmlns:a14="http://schemas.microsoft.com/office/drawing/2010/main" val="0"/>
@@ -3540,8 +3557,8 @@
         </p:blipFill>
         <p:spPr bwMode="auto">
           <a:xfrm>
-            <a:off x="9077739" y="-4730"/>
-            <a:ext cx="3090253" cy="3090253"/>
+            <a:off x="9713843" y="-4730"/>
+            <a:ext cx="2454149" cy="2454149"/>
           </a:xfrm>
           <a:prstGeom prst="rect">
             <a:avLst/>
@@ -3669,6 +3686,14 @@
   <p:clrMapOvr>
     <a:masterClrMapping/>
   </p:clrMapOvr>
+  <mc:AlternateContent xmlns:mc="http://schemas.openxmlformats.org/markup-compatibility/2006">
+    <mc:Choice xmlns:p14="http://schemas.microsoft.com/office/powerpoint/2010/main" Requires="p14">
+      <p:transition spd="slow" p14:dur="2000" advClick="0"/>
+    </mc:Choice>
+    <mc:Fallback>
+      <p:transition spd="slow" advClick="0"/>
+    </mc:Fallback>
+  </mc:AlternateContent>
 </p:sld>
 </file>
 
@@ -5522,8 +5547,8 @@
           </a:p>
         </p:txBody>
       </p:sp>
-      <mc:AlternateContent xmlns:mc="http://schemas.openxmlformats.org/markup-compatibility/2006">
-        <mc:Choice xmlns:a14="http://schemas.microsoft.com/office/drawing/2010/main" Requires="a14">
+      <mc:AlternateContent xmlns:mc="http://schemas.openxmlformats.org/markup-compatibility/2006" xmlns:a14="http://schemas.microsoft.com/office/drawing/2010/main">
+        <mc:Choice Requires="a14">
           <p:sp>
             <p:nvSpPr>
               <p:cNvPr id="3" name="Marcador de contenido 2">
@@ -5625,7 +5650,7 @@
             </p:txBody>
           </p:sp>
         </mc:Choice>
-        <mc:Fallback>
+        <mc:Fallback xmlns="">
           <p:sp>
             <p:nvSpPr>
               <p:cNvPr id="3" name="Marcador de contenido 2">

</xml_diff>

<commit_message>
agregamos algunos ejemplo 8 y 9
</commit_message>
<xml_diff>
--- a/Capitulo2_JoseMenaDelgado/Variables Funciones y Graficas.pptx
+++ b/Capitulo2_JoseMenaDelgado/Variables Funciones y Graficas.pptx
@@ -3686,11 +3686,11 @@
   <p:clrMapOvr>
     <a:masterClrMapping/>
   </p:clrMapOvr>
-  <mc:AlternateContent xmlns:mc="http://schemas.openxmlformats.org/markup-compatibility/2006">
-    <mc:Choice xmlns:p14="http://schemas.microsoft.com/office/powerpoint/2010/main" Requires="p14">
+  <mc:AlternateContent xmlns:mc="http://schemas.openxmlformats.org/markup-compatibility/2006" xmlns:p14="http://schemas.microsoft.com/office/powerpoint/2010/main">
+    <mc:Choice Requires="p14">
       <p:transition spd="slow" p14:dur="2000" advClick="0"/>
     </mc:Choice>
-    <mc:Fallback>
+    <mc:Fallback xmlns="">
       <p:transition spd="slow" advClick="0"/>
     </mc:Fallback>
   </mc:AlternateContent>
@@ -3817,22 +3817,34 @@
           <a:p>
             <a:pPr algn="just"/>
             <a:r>
-              <a:rPr lang="es-MX"/>
+              <a:rPr lang="es-MX" dirty="0"/>
               <a:t>En muchas aplicaciones científicas y de ingeniería es necesario describir datos de</a:t>
             </a:r>
           </a:p>
           <a:p>
             <a:pPr algn="just"/>
             <a:r>
-              <a:rPr lang="es-MX"/>
+              <a:rPr lang="es-MX" dirty="0"/>
               <a:t>mediciones en forma analítica por medio de un polinomio usando: </a:t>
             </a:r>
           </a:p>
           <a:p>
             <a:pPr algn="ctr"/>
             <a:r>
-              <a:rPr lang="es-MX" b="1" i="1"/>
-              <a:t>polyfit(x,y,n)</a:t>
+              <a:rPr lang="es-MX" b="1" i="1" dirty="0" err="1"/>
+              <a:t>polyfit</a:t>
+            </a:r>
+            <a:r>
+              <a:rPr lang="es-MX" b="1" i="1" dirty="0"/>
+              <a:t>(</a:t>
+            </a:r>
+            <a:r>
+              <a:rPr lang="es-MX" b="1" i="1" dirty="0" err="1"/>
+              <a:t>x,y,n</a:t>
+            </a:r>
+            <a:r>
+              <a:rPr lang="es-MX" b="1" i="1" dirty="0"/>
+              <a:t>)</a:t>
             </a:r>
           </a:p>
           <a:p>
@@ -4892,7 +4904,7 @@
         </p:blipFill>
         <p:spPr>
           <a:xfrm>
-            <a:off x="3315859" y="4570927"/>
+            <a:off x="1350558" y="4209506"/>
             <a:ext cx="5091162" cy="2148961"/>
           </a:xfrm>
           <a:prstGeom prst="rect">
@@ -5005,7 +5017,7 @@
         </p:blipFill>
         <p:spPr>
           <a:xfrm>
-            <a:off x="3113465" y="3541213"/>
+            <a:off x="2727324" y="3610215"/>
             <a:ext cx="5798484" cy="3247785"/>
           </a:xfrm>
           <a:prstGeom prst="rect">
@@ -5140,58 +5152,6 @@
             <a:r>
               <a:rPr lang="es-MX" dirty="0"/>
               <a:t>MATLAB. Si deseamos obtener una grafica superficial de ella, la podemos graficar con:</a:t>
-            </a:r>
-          </a:p>
-        </p:txBody>
-      </p:sp>
-      <p:sp>
-        <p:nvSpPr>
-          <p:cNvPr id="6" name="CuadroTexto 5">
-            <a:extLst>
-              <a:ext uri="{FF2B5EF4-FFF2-40B4-BE49-F238E27FC236}">
-                <a16:creationId xmlns:a16="http://schemas.microsoft.com/office/drawing/2014/main" id="{83749842-27B1-496B-A91F-2C8468B7DCE7}"/>
-              </a:ext>
-            </a:extLst>
-          </p:cNvPr>
-          <p:cNvSpPr txBox="1"/>
-          <p:nvPr/>
-        </p:nvSpPr>
-        <p:spPr>
-          <a:xfrm>
-            <a:off x="5486400" y="6520071"/>
-            <a:ext cx="6663117" cy="307777"/>
-          </a:xfrm>
-          <a:prstGeom prst="rect">
-            <a:avLst/>
-          </a:prstGeom>
-          <a:noFill/>
-        </p:spPr>
-        <p:txBody>
-          <a:bodyPr wrap="square" rtlCol="0">
-            <a:spAutoFit/>
-          </a:bodyPr>
-          <a:lstStyle/>
-          <a:p>
-            <a:r>
-              <a:rPr lang="es-MX" sz="1400" dirty="0">
-                <a:latin typeface="Times New Roman" panose="02020603050405020304" pitchFamily="18" charset="0"/>
-                <a:cs typeface="Times New Roman" panose="02020603050405020304" pitchFamily="18" charset="0"/>
-              </a:rPr>
-              <a:t>Véase el ejemplo “</a:t>
-            </a:r>
-            <a:r>
-              <a:rPr lang="es-MX" sz="1400" b="1" i="1" dirty="0">
-                <a:latin typeface="Times New Roman" panose="02020603050405020304" pitchFamily="18" charset="0"/>
-                <a:cs typeface="Times New Roman" panose="02020603050405020304" pitchFamily="18" charset="0"/>
-              </a:rPr>
-              <a:t>Graficas_Ejemplo4.m</a:t>
-            </a:r>
-            <a:r>
-              <a:rPr lang="es-MX" sz="1400" dirty="0">
-                <a:latin typeface="Times New Roman" panose="02020603050405020304" pitchFamily="18" charset="0"/>
-                <a:cs typeface="Times New Roman" panose="02020603050405020304" pitchFamily="18" charset="0"/>
-              </a:rPr>
-              <a:t>” para ver los ejemplos relacionados con el tema.</a:t>
             </a:r>
           </a:p>
         </p:txBody>
@@ -6782,7 +6742,7 @@
         </p:blipFill>
         <p:spPr>
           <a:xfrm>
-            <a:off x="168916" y="2886468"/>
+            <a:off x="102674" y="3031020"/>
             <a:ext cx="6854716" cy="2454158"/>
           </a:xfrm>
           <a:prstGeom prst="rect">

</xml_diff>